<commit_message>
Documentacao e apresentacao atualizados
</commit_message>
<xml_diff>
--- a/Apresentação PI.pptx
+++ b/Apresentação PI.pptx
@@ -3362,7 +3362,7 @@
           <a:p>
             <a:fld id="{8A445647-6526-465F-8F7E-8E2F6F32F604}" type="datetimeFigureOut">
               <a:rPr lang="pt-BR" smtClean="0"/>
-              <a:t>07/11/2023</a:t>
+              <a:t>28/11/2023</a:t>
             </a:fld>
             <a:endParaRPr lang="pt-BR"/>
           </a:p>
@@ -3560,7 +3560,7 @@
           <a:p>
             <a:fld id="{8A445647-6526-465F-8F7E-8E2F6F32F604}" type="datetimeFigureOut">
               <a:rPr lang="pt-BR" smtClean="0"/>
-              <a:t>07/11/2023</a:t>
+              <a:t>28/11/2023</a:t>
             </a:fld>
             <a:endParaRPr lang="pt-BR"/>
           </a:p>
@@ -3801,7 +3801,7 @@
           <a:p>
             <a:fld id="{8A445647-6526-465F-8F7E-8E2F6F32F604}" type="datetimeFigureOut">
               <a:rPr lang="pt-BR" smtClean="0"/>
-              <a:t>07/11/2023</a:t>
+              <a:t>28/11/2023</a:t>
             </a:fld>
             <a:endParaRPr lang="pt-BR"/>
           </a:p>
@@ -6544,7 +6544,7 @@
         <p:spPr>
           <a:xfrm>
             <a:off x="323435" y="219068"/>
-            <a:ext cx="2610010" cy="584775"/>
+            <a:ext cx="3218510" cy="584775"/>
           </a:xfrm>
           <a:prstGeom prst="rect">
             <a:avLst/>
@@ -6558,19 +6558,54 @@
           <a:lstStyle/>
           <a:p>
             <a:r>
-              <a:rPr lang="en-US" sz="3200" b="1" dirty="0"/>
-              <a:t>Acessibilidade</a:t>
+              <a:rPr lang="pt-BR" sz="3200" b="1" dirty="0"/>
+              <a:t>Acesso ao projeto</a:t>
             </a:r>
-            <a:endParaRPr lang="pt-BR" sz="3200" b="1" dirty="0"/>
           </a:p>
         </p:txBody>
       </p:sp>
+      <p:pic>
+        <p:nvPicPr>
+          <p:cNvPr id="3" name="Imagem 2" descr="Código QR&#10;&#10;Descrição gerada automaticamente">
+            <a:extLst>
+              <a:ext uri="{FF2B5EF4-FFF2-40B4-BE49-F238E27FC236}">
+                <a16:creationId xmlns:a16="http://schemas.microsoft.com/office/drawing/2014/main" id="{18EDE41E-075B-AC14-0109-DBF4EE0C35DE}"/>
+              </a:ext>
+            </a:extLst>
+          </p:cNvPr>
+          <p:cNvPicPr>
+            <a:picLocks noChangeAspect="1"/>
+          </p:cNvPicPr>
+          <p:nvPr/>
+        </p:nvPicPr>
+        <p:blipFill>
+          <a:blip r:embed="rId2">
+            <a:extLst>
+              <a:ext uri="{28A0092B-C50C-407E-A947-70E740481C1C}">
+                <a14:useLocalDpi xmlns:a14="http://schemas.microsoft.com/office/drawing/2010/main" val="0"/>
+              </a:ext>
+            </a:extLst>
+          </a:blip>
+          <a:stretch>
+            <a:fillRect/>
+          </a:stretch>
+        </p:blipFill>
+        <p:spPr>
+          <a:xfrm>
+            <a:off x="1100290" y="2155110"/>
+            <a:ext cx="2857500" cy="2857500"/>
+          </a:xfrm>
+          <a:prstGeom prst="rect">
+            <a:avLst/>
+          </a:prstGeom>
+        </p:spPr>
+      </p:pic>
       <p:sp>
         <p:nvSpPr>
-          <p:cNvPr id="15" name="CaixaDeTexto 14">
+          <p:cNvPr id="4" name="CaixaDeTexto 3">
             <a:extLst>
               <a:ext uri="{FF2B5EF4-FFF2-40B4-BE49-F238E27FC236}">
-                <a16:creationId xmlns:a16="http://schemas.microsoft.com/office/drawing/2014/main" id="{EF51844B-E3AF-58FD-F32D-4B7AB5AC73FB}"/>
+                <a16:creationId xmlns:a16="http://schemas.microsoft.com/office/drawing/2014/main" id="{D06A7694-2ECC-F6FA-BF97-7C1A87C0BCA5}"/>
               </a:ext>
             </a:extLst>
           </p:cNvPr>
@@ -6579,61 +6614,72 @@
         </p:nvSpPr>
         <p:spPr>
           <a:xfrm>
-            <a:off x="1571087" y="1723420"/>
-            <a:ext cx="2259012" cy="1569660"/>
+            <a:off x="581263" y="1293336"/>
+            <a:ext cx="3980129" cy="861774"/>
+          </a:xfrm>
+          <a:prstGeom prst="rect">
+            <a:avLst/>
+          </a:prstGeom>
+          <a:noFill/>
+        </p:spPr>
+        <p:txBody>
+          <a:bodyPr wrap="none" rtlCol="0">
+            <a:spAutoFit/>
+          </a:bodyPr>
+          <a:lstStyle/>
+          <a:p>
+            <a:r>
+              <a:rPr lang="pt-BR" sz="3200" b="1" dirty="0"/>
+              <a:t>Repositório do GitHub</a:t>
+            </a:r>
+          </a:p>
+          <a:p>
+            <a:endParaRPr lang="en-US" dirty="0"/>
+          </a:p>
+        </p:txBody>
+      </p:sp>
+      <p:pic>
+        <p:nvPicPr>
+          <p:cNvPr id="6" name="Imagem 5" descr="Código QR&#10;&#10;Descrição gerada automaticamente">
+            <a:extLst>
+              <a:ext uri="{FF2B5EF4-FFF2-40B4-BE49-F238E27FC236}">
+                <a16:creationId xmlns:a16="http://schemas.microsoft.com/office/drawing/2014/main" id="{601AE2BA-3EDB-555E-9347-B23F2019F11F}"/>
+              </a:ext>
+            </a:extLst>
+          </p:cNvPr>
+          <p:cNvPicPr>
+            <a:picLocks noChangeAspect="1"/>
+          </p:cNvPicPr>
+          <p:nvPr/>
+        </p:nvPicPr>
+        <p:blipFill>
+          <a:blip r:embed="rId3">
+            <a:extLst>
+              <a:ext uri="{28A0092B-C50C-407E-A947-70E740481C1C}">
+                <a14:useLocalDpi xmlns:a14="http://schemas.microsoft.com/office/drawing/2010/main" val="0"/>
+              </a:ext>
+            </a:extLst>
+          </a:blip>
+          <a:stretch>
+            <a:fillRect/>
+          </a:stretch>
+        </p:blipFill>
+        <p:spPr>
+          <a:xfrm>
+            <a:off x="7467234" y="2000250"/>
+            <a:ext cx="2857500" cy="2857500"/>
           </a:xfrm>
           <a:prstGeom prst="rect">
             <a:avLst/>
           </a:prstGeom>
         </p:spPr>
-        <p:style>
-          <a:lnRef idx="1">
-            <a:schemeClr val="accent6"/>
-          </a:lnRef>
-          <a:fillRef idx="3">
-            <a:schemeClr val="accent6"/>
-          </a:fillRef>
-          <a:effectRef idx="2">
-            <a:schemeClr val="accent6"/>
-          </a:effectRef>
-          <a:fontRef idx="minor">
-            <a:schemeClr val="lt1"/>
-          </a:fontRef>
-        </p:style>
-        <p:txBody>
-          <a:bodyPr wrap="square">
-            <a:spAutoFit/>
-          </a:bodyPr>
-          <a:lstStyle/>
-          <a:p>
-            <a:pPr marR="0" lvl="0" algn="ctr">
-              <a:spcBef>
-                <a:spcPts val="600"/>
-              </a:spcBef>
-              <a:spcAft>
-                <a:spcPts val="0"/>
-              </a:spcAft>
-              <a:buClr>
-                <a:srgbClr val="000000"/>
-              </a:buClr>
-            </a:pPr>
-            <a:r>
-              <a:rPr lang="pt-BR" sz="2400" dirty="0">
-                <a:effectLst/>
-                <a:latin typeface="Times New Roman" panose="02020603050405020304" pitchFamily="18" charset="0"/>
-                <a:ea typeface="Times New Roman" panose="02020603050405020304" pitchFamily="18" charset="0"/>
-              </a:rPr>
-              <a:t>Acesso ao conteúdo das páginas apenas pelo teclado</a:t>
-            </a:r>
-          </a:p>
-        </p:txBody>
-      </p:sp>
+      </p:pic>
       <p:sp>
         <p:nvSpPr>
-          <p:cNvPr id="16" name="CaixaDeTexto 15">
+          <p:cNvPr id="9" name="CaixaDeTexto 8">
             <a:extLst>
               <a:ext uri="{FF2B5EF4-FFF2-40B4-BE49-F238E27FC236}">
-                <a16:creationId xmlns:a16="http://schemas.microsoft.com/office/drawing/2014/main" id="{649A87B4-0602-2199-669A-AD67A1FE0085}"/>
+                <a16:creationId xmlns:a16="http://schemas.microsoft.com/office/drawing/2014/main" id="{25EEF200-620E-A34B-7148-C5FC34378CF2}"/>
               </a:ext>
             </a:extLst>
           </p:cNvPr>
@@ -6642,240 +6688,23 @@
         </p:nvSpPr>
         <p:spPr>
           <a:xfrm>
-            <a:off x="8099963" y="1816427"/>
-            <a:ext cx="2259012" cy="1200329"/>
+            <a:off x="6995491" y="1293336"/>
+            <a:ext cx="7742582" cy="584775"/>
           </a:xfrm>
           <a:prstGeom prst="rect">
             <a:avLst/>
           </a:prstGeom>
+          <a:noFill/>
         </p:spPr>
-        <p:style>
-          <a:lnRef idx="1">
-            <a:schemeClr val="accent6"/>
-          </a:lnRef>
-          <a:fillRef idx="3">
-            <a:schemeClr val="accent6"/>
-          </a:fillRef>
-          <a:effectRef idx="2">
-            <a:schemeClr val="accent6"/>
-          </a:effectRef>
-          <a:fontRef idx="minor">
-            <a:schemeClr val="lt1"/>
-          </a:fontRef>
-        </p:style>
         <p:txBody>
           <a:bodyPr wrap="square">
             <a:spAutoFit/>
           </a:bodyPr>
           <a:lstStyle/>
           <a:p>
-            <a:pPr marR="0" lvl="0" algn="ctr">
-              <a:spcBef>
-                <a:spcPts val="600"/>
-              </a:spcBef>
-              <a:spcAft>
-                <a:spcPts val="0"/>
-              </a:spcAft>
-              <a:buClr>
-                <a:srgbClr val="000000"/>
-              </a:buClr>
-            </a:pPr>
             <a:r>
-              <a:rPr lang="pt-BR" sz="2400" dirty="0">
-                <a:effectLst/>
-                <a:latin typeface="Times New Roman" panose="02020603050405020304" pitchFamily="18" charset="0"/>
-                <a:ea typeface="Times New Roman" panose="02020603050405020304" pitchFamily="18" charset="0"/>
-              </a:rPr>
-              <a:t>Legendas nas imagens para leitores de tela</a:t>
-            </a:r>
-          </a:p>
-        </p:txBody>
-      </p:sp>
-      <p:sp>
-        <p:nvSpPr>
-          <p:cNvPr id="18" name="CaixaDeTexto 17">
-            <a:extLst>
-              <a:ext uri="{FF2B5EF4-FFF2-40B4-BE49-F238E27FC236}">
-                <a16:creationId xmlns:a16="http://schemas.microsoft.com/office/drawing/2014/main" id="{1F7E4F5E-B7A8-DF08-DD01-36C2F17E0B38}"/>
-              </a:ext>
-            </a:extLst>
-          </p:cNvPr>
-          <p:cNvSpPr txBox="1"/>
-          <p:nvPr/>
-        </p:nvSpPr>
-        <p:spPr>
-          <a:xfrm>
-            <a:off x="1571087" y="3969207"/>
-            <a:ext cx="2259012" cy="1569660"/>
-          </a:xfrm>
-          <a:prstGeom prst="rect">
-            <a:avLst/>
-          </a:prstGeom>
-        </p:spPr>
-        <p:style>
-          <a:lnRef idx="1">
-            <a:schemeClr val="accent6"/>
-          </a:lnRef>
-          <a:fillRef idx="3">
-            <a:schemeClr val="accent6"/>
-          </a:fillRef>
-          <a:effectRef idx="2">
-            <a:schemeClr val="accent6"/>
-          </a:effectRef>
-          <a:fontRef idx="minor">
-            <a:schemeClr val="lt1"/>
-          </a:fontRef>
-        </p:style>
-        <p:txBody>
-          <a:bodyPr wrap="square">
-            <a:spAutoFit/>
-          </a:bodyPr>
-          <a:lstStyle/>
-          <a:p>
-            <a:pPr marR="0" lvl="0" algn="ctr">
-              <a:spcBef>
-                <a:spcPts val="600"/>
-              </a:spcBef>
-              <a:spcAft>
-                <a:spcPts val="0"/>
-              </a:spcAft>
-              <a:buClr>
-                <a:srgbClr val="000000"/>
-              </a:buClr>
-            </a:pPr>
-            <a:r>
-              <a:rPr lang="pt-BR" sz="2400" dirty="0">
-                <a:effectLst/>
-                <a:latin typeface="Times New Roman" panose="02020603050405020304" pitchFamily="18" charset="0"/>
-                <a:ea typeface="Times New Roman" panose="02020603050405020304" pitchFamily="18" charset="0"/>
-              </a:rPr>
-              <a:t>Design responsivo que se adapta a diferentes telas</a:t>
-            </a:r>
-          </a:p>
-        </p:txBody>
-      </p:sp>
-      <p:sp>
-        <p:nvSpPr>
-          <p:cNvPr id="19" name="CaixaDeTexto 18">
-            <a:extLst>
-              <a:ext uri="{FF2B5EF4-FFF2-40B4-BE49-F238E27FC236}">
-                <a16:creationId xmlns:a16="http://schemas.microsoft.com/office/drawing/2014/main" id="{567B65A6-3DD5-48CB-555A-A2326F61CC23}"/>
-              </a:ext>
-            </a:extLst>
-          </p:cNvPr>
-          <p:cNvSpPr txBox="1"/>
-          <p:nvPr/>
-        </p:nvSpPr>
-        <p:spPr>
-          <a:xfrm>
-            <a:off x="8099963" y="4153872"/>
-            <a:ext cx="2259012" cy="1200329"/>
-          </a:xfrm>
-          <a:prstGeom prst="rect">
-            <a:avLst/>
-          </a:prstGeom>
-        </p:spPr>
-        <p:style>
-          <a:lnRef idx="1">
-            <a:schemeClr val="accent6"/>
-          </a:lnRef>
-          <a:fillRef idx="3">
-            <a:schemeClr val="accent6"/>
-          </a:fillRef>
-          <a:effectRef idx="2">
-            <a:schemeClr val="accent6"/>
-          </a:effectRef>
-          <a:fontRef idx="minor">
-            <a:schemeClr val="lt1"/>
-          </a:fontRef>
-        </p:style>
-        <p:txBody>
-          <a:bodyPr wrap="square">
-            <a:spAutoFit/>
-          </a:bodyPr>
-          <a:lstStyle/>
-          <a:p>
-            <a:pPr marR="0" lvl="0" algn="ctr">
-              <a:spcBef>
-                <a:spcPts val="600"/>
-              </a:spcBef>
-              <a:spcAft>
-                <a:spcPts val="0"/>
-              </a:spcAft>
-              <a:buClr>
-                <a:srgbClr val="000000"/>
-              </a:buClr>
-            </a:pPr>
-            <a:r>
-              <a:rPr lang="pt-BR" sz="2400" dirty="0">
-                <a:effectLst/>
-                <a:latin typeface="Times New Roman" panose="02020603050405020304" pitchFamily="18" charset="0"/>
-                <a:ea typeface="Times New Roman" panose="02020603050405020304" pitchFamily="18" charset="0"/>
-              </a:rPr>
-              <a:t>Descrição do conteúdo de vídeos</a:t>
-            </a:r>
-          </a:p>
-        </p:txBody>
-      </p:sp>
-      <p:sp>
-        <p:nvSpPr>
-          <p:cNvPr id="20" name="CaixaDeTexto 19">
-            <a:extLst>
-              <a:ext uri="{FF2B5EF4-FFF2-40B4-BE49-F238E27FC236}">
-                <a16:creationId xmlns:a16="http://schemas.microsoft.com/office/drawing/2014/main" id="{8169B7D4-3BC2-5FC4-438A-F28884DBE80D}"/>
-              </a:ext>
-            </a:extLst>
-          </p:cNvPr>
-          <p:cNvSpPr txBox="1"/>
-          <p:nvPr/>
-        </p:nvSpPr>
-        <p:spPr>
-          <a:xfrm>
-            <a:off x="4835525" y="1723420"/>
-            <a:ext cx="2259012" cy="1569660"/>
-          </a:xfrm>
-          <a:prstGeom prst="rect">
-            <a:avLst/>
-          </a:prstGeom>
-        </p:spPr>
-        <p:style>
-          <a:lnRef idx="1">
-            <a:schemeClr val="accent6"/>
-          </a:lnRef>
-          <a:fillRef idx="3">
-            <a:schemeClr val="accent6"/>
-          </a:fillRef>
-          <a:effectRef idx="2">
-            <a:schemeClr val="accent6"/>
-          </a:effectRef>
-          <a:fontRef idx="minor">
-            <a:schemeClr val="lt1"/>
-          </a:fontRef>
-        </p:style>
-        <p:txBody>
-          <a:bodyPr wrap="square">
-            <a:spAutoFit/>
-          </a:bodyPr>
-          <a:lstStyle/>
-          <a:p>
-            <a:pPr marR="0" lvl="0" algn="ctr">
-              <a:spcBef>
-                <a:spcPts val="600"/>
-              </a:spcBef>
-              <a:spcAft>
-                <a:spcPts val="0"/>
-              </a:spcAft>
-              <a:buClr>
-                <a:srgbClr val="000000"/>
-              </a:buClr>
-            </a:pPr>
-            <a:r>
-              <a:rPr lang="pt-BR" sz="2400" dirty="0">
-                <a:effectLst/>
-                <a:latin typeface="Times New Roman" panose="02020603050405020304" pitchFamily="18" charset="0"/>
-                <a:ea typeface="Times New Roman" panose="02020603050405020304" pitchFamily="18" charset="0"/>
-              </a:rPr>
-              <a:t>Cor do texto com bom contraste ao fundo</a:t>
+              <a:rPr lang="pt-BR" sz="3200" b="1" dirty="0"/>
+              <a:t>Divisão do trabalho</a:t>
             </a:r>
           </a:p>
         </p:txBody>

</xml_diff>